<commit_message>
Fixes in Rmd's: Execution errors solved, Improved rmd visualization
</commit_message>
<xml_diff>
--- a/GGplot_workshop.pptx
+++ b/GGplot_workshop.pptx
@@ -321,7 +321,7 @@
           <a:p>
             <a:fld id="{CCF4B7E2-48F8-4828-A28B-C5A5110B8634}" type="datetimeFigureOut">
               <a:rPr lang="en-GB" smtClean="0"/>
-              <a:t>10/03/2025</a:t>
+              <a:t>13/03/2025</a:t>
             </a:fld>
             <a:endParaRPr lang="en-GB"/>
           </a:p>
@@ -521,7 +521,7 @@
           <a:p>
             <a:fld id="{CCF4B7E2-48F8-4828-A28B-C5A5110B8634}" type="datetimeFigureOut">
               <a:rPr lang="en-GB" smtClean="0"/>
-              <a:t>10/03/2025</a:t>
+              <a:t>13/03/2025</a:t>
             </a:fld>
             <a:endParaRPr lang="en-GB"/>
           </a:p>
@@ -731,7 +731,7 @@
           <a:p>
             <a:fld id="{CCF4B7E2-48F8-4828-A28B-C5A5110B8634}" type="datetimeFigureOut">
               <a:rPr lang="en-GB" smtClean="0"/>
-              <a:t>10/03/2025</a:t>
+              <a:t>13/03/2025</a:t>
             </a:fld>
             <a:endParaRPr lang="en-GB"/>
           </a:p>
@@ -931,7 +931,7 @@
           <a:p>
             <a:fld id="{CCF4B7E2-48F8-4828-A28B-C5A5110B8634}" type="datetimeFigureOut">
               <a:rPr lang="en-GB" smtClean="0"/>
-              <a:t>10/03/2025</a:t>
+              <a:t>13/03/2025</a:t>
             </a:fld>
             <a:endParaRPr lang="en-GB"/>
           </a:p>
@@ -1207,7 +1207,7 @@
           <a:p>
             <a:fld id="{CCF4B7E2-48F8-4828-A28B-C5A5110B8634}" type="datetimeFigureOut">
               <a:rPr lang="en-GB" smtClean="0"/>
-              <a:t>10/03/2025</a:t>
+              <a:t>13/03/2025</a:t>
             </a:fld>
             <a:endParaRPr lang="en-GB"/>
           </a:p>
@@ -1475,7 +1475,7 @@
           <a:p>
             <a:fld id="{CCF4B7E2-48F8-4828-A28B-C5A5110B8634}" type="datetimeFigureOut">
               <a:rPr lang="en-GB" smtClean="0"/>
-              <a:t>10/03/2025</a:t>
+              <a:t>13/03/2025</a:t>
             </a:fld>
             <a:endParaRPr lang="en-GB"/>
           </a:p>
@@ -1890,7 +1890,7 @@
           <a:p>
             <a:fld id="{CCF4B7E2-48F8-4828-A28B-C5A5110B8634}" type="datetimeFigureOut">
               <a:rPr lang="en-GB" smtClean="0"/>
-              <a:t>10/03/2025</a:t>
+              <a:t>13/03/2025</a:t>
             </a:fld>
             <a:endParaRPr lang="en-GB"/>
           </a:p>
@@ -2032,7 +2032,7 @@
           <a:p>
             <a:fld id="{CCF4B7E2-48F8-4828-A28B-C5A5110B8634}" type="datetimeFigureOut">
               <a:rPr lang="en-GB" smtClean="0"/>
-              <a:t>10/03/2025</a:t>
+              <a:t>13/03/2025</a:t>
             </a:fld>
             <a:endParaRPr lang="en-GB"/>
           </a:p>
@@ -2145,7 +2145,7 @@
           <a:p>
             <a:fld id="{CCF4B7E2-48F8-4828-A28B-C5A5110B8634}" type="datetimeFigureOut">
               <a:rPr lang="en-GB" smtClean="0"/>
-              <a:t>10/03/2025</a:t>
+              <a:t>13/03/2025</a:t>
             </a:fld>
             <a:endParaRPr lang="en-GB"/>
           </a:p>
@@ -2458,7 +2458,7 @@
           <a:p>
             <a:fld id="{CCF4B7E2-48F8-4828-A28B-C5A5110B8634}" type="datetimeFigureOut">
               <a:rPr lang="en-GB" smtClean="0"/>
-              <a:t>10/03/2025</a:t>
+              <a:t>13/03/2025</a:t>
             </a:fld>
             <a:endParaRPr lang="en-GB"/>
           </a:p>
@@ -2747,7 +2747,7 @@
           <a:p>
             <a:fld id="{CCF4B7E2-48F8-4828-A28B-C5A5110B8634}" type="datetimeFigureOut">
               <a:rPr lang="en-GB" smtClean="0"/>
-              <a:t>10/03/2025</a:t>
+              <a:t>13/03/2025</a:t>
             </a:fld>
             <a:endParaRPr lang="en-GB"/>
           </a:p>
@@ -2990,7 +2990,7 @@
           <a:p>
             <a:fld id="{CCF4B7E2-48F8-4828-A28B-C5A5110B8634}" type="datetimeFigureOut">
               <a:rPr lang="en-GB" smtClean="0"/>
-              <a:t>10/03/2025</a:t>
+              <a:t>13/03/2025</a:t>
             </a:fld>
             <a:endParaRPr lang="en-GB"/>
           </a:p>
@@ -22575,7 +22575,7 @@
 </file>
 
 <file path=ppt/slides/slide3.xml><?xml version="1.0" encoding="utf-8"?>
-<p:sld xmlns:a="http://schemas.openxmlformats.org/drawingml/2006/main" xmlns:r="http://schemas.openxmlformats.org/officeDocument/2006/relationships" xmlns:p="http://schemas.openxmlformats.org/presentationml/2006/main">
+<p:sld xmlns:a="http://schemas.openxmlformats.org/drawingml/2006/main" xmlns:r="http://schemas.openxmlformats.org/officeDocument/2006/relationships" xmlns:p="http://schemas.openxmlformats.org/presentationml/2006/main" show="0">
   <p:cSld>
     <p:spTree>
       <p:nvGrpSpPr>
@@ -23074,6 +23074,13 @@
             </a:r>
           </a:p>
           <a:p>
+            <a:pPr lvl="1"/>
+            <a:r>
+              <a:rPr lang="en-US" dirty="0"/>
+              <a:t>library(patchwork)</a:t>
+            </a:r>
+          </a:p>
+          <a:p>
             <a:pPr marL="285750" indent="-285750">
               <a:buFont typeface="Wingdings" panose="05000000000000000000" pitchFamily="2" charset="2"/>
               <a:buChar char="v"/>
@@ -23114,6 +23121,14 @@
             </a:r>
             <a:r>
               <a:rPr lang="en-US" dirty="0"/>
+              <a:t>)		library(</a:t>
+            </a:r>
+            <a:r>
+              <a:rPr lang="en-US" dirty="0" err="1"/>
+              <a:t>gt</a:t>
+            </a:r>
+            <a:r>
+              <a:rPr lang="en-US" dirty="0"/>
               <a:t>)</a:t>
             </a:r>
           </a:p>
@@ -23214,21 +23229,6 @@
             <a:r>
               <a:rPr lang="en-US" dirty="0"/>
               <a:t>)		library(wordcloud2)</a:t>
-            </a:r>
-          </a:p>
-          <a:p>
-            <a:pPr lvl="1"/>
-            <a:r>
-              <a:rPr lang="en-US" dirty="0"/>
-              <a:t>library(</a:t>
-            </a:r>
-            <a:r>
-              <a:rPr lang="en-US" dirty="0" err="1"/>
-              <a:t>gt</a:t>
-            </a:r>
-            <a:r>
-              <a:rPr lang="en-US" dirty="0"/>
-              <a:t>)</a:t>
             </a:r>
           </a:p>
         </p:txBody>

</xml_diff>